<commit_message>
add demo to .exe
</commit_message>
<xml_diff>
--- a/DiapoSimu3Delda.pptx
+++ b/DiapoSimu3Delda.pptx
@@ -5,10 +5,10 @@
     <p:sldMasterId id="2147483648" r:id="rId1"/>
   </p:sldMasterIdLst>
   <p:notesMasterIdLst>
-    <p:notesMasterId r:id="rId22"/>
+    <p:notesMasterId r:id="rId23"/>
   </p:notesMasterIdLst>
   <p:handoutMasterIdLst>
-    <p:handoutMasterId r:id="rId23"/>
+    <p:handoutMasterId r:id="rId24"/>
   </p:handoutMasterIdLst>
   <p:sldIdLst>
     <p:sldId id="259" r:id="rId2"/>
@@ -31,6 +31,7 @@
     <p:sldId id="274" r:id="rId19"/>
     <p:sldId id="275" r:id="rId20"/>
     <p:sldId id="276" r:id="rId21"/>
+    <p:sldId id="277" r:id="rId22"/>
   </p:sldIdLst>
   <p:sldSz cx="12192000" cy="6858000"/>
   <p:notesSz cx="6858000" cy="9144000"/>
@@ -154,6 +155,7 @@
             <p14:sldId id="274"/>
             <p14:sldId id="275"/>
             <p14:sldId id="276"/>
+            <p14:sldId id="277"/>
           </p14:sldIdLst>
         </p14:section>
       </p14:sectionLst>
@@ -5182,7 +5184,7 @@
             </a:r>
             <a:r>
               <a:rPr lang="fr-FR" dirty="0" err="1"/>
-              <a:t>débug</a:t>
+              <a:t>debug</a:t>
             </a:r>
             <a:endParaRPr lang="fr-FR" dirty="0"/>
           </a:p>
@@ -5336,13 +5338,8 @@
           <a:p>
             <a:r>
               <a:rPr lang="fr-FR" dirty="0"/>
-              <a:t>Réaliser un mode dégradé pour pouvoir présenter </a:t>
-            </a:r>
-            <a:r>
-              <a:rPr lang="fr-FR" dirty="0" err="1"/>
-              <a:t>quelquechose</a:t>
-            </a:r>
-            <a:endParaRPr lang="fr-FR" dirty="0"/>
+              <a:t>Réaliser un mode dégradé pour pouvoir présenter quelque chose</a:t>
+            </a:r>
           </a:p>
           <a:p>
             <a:pPr lvl="1"/>
@@ -5543,7 +5540,7 @@
           <p:nvPr>
             <p:extLst>
               <p:ext uri="{D42A27DB-BD31-4B8C-83A1-F6EECF244321}">
-                <p14:modId xmlns:p14="http://schemas.microsoft.com/office/powerpoint/2010/main" val="3853157031"/>
+                <p14:modId xmlns:p14="http://schemas.microsoft.com/office/powerpoint/2010/main" val="708657290"/>
               </p:ext>
             </p:extLst>
           </p:nvPr>
@@ -5589,7 +5586,7 @@
                     <a:p>
                       <a:r>
                         <a:rPr lang="fr-FR" dirty="0"/>
-                        <a:t>Problèmes</a:t>
+                        <a:t>Problèmes rencontrés</a:t>
                       </a:r>
                       <a:endParaRPr lang="en-US" dirty="0"/>
                     </a:p>
@@ -7984,19 +7981,56 @@
           <a:p>
             <a:r>
               <a:rPr lang="fr-FR" dirty="0"/>
-              <a:t>Le travail reste inachevé</a:t>
-            </a:r>
-          </a:p>
-          <a:p>
+              <a:t>L’objectif initial du projet n’a pas été atteint</a:t>
+            </a:r>
+          </a:p>
+          <a:p>
+            <a:pPr lvl="1"/>
             <a:r>
               <a:rPr lang="fr-FR" dirty="0"/>
-              <a:t>Pour un si gros projet le travail en solo est compliqué </a:t>
-            </a:r>
-            <a:r>
-              <a:rPr lang="fr-FR"/>
-              <a:t>et chronophage</a:t>
-            </a:r>
-            <a:endParaRPr lang="en-US" dirty="0"/>
+              <a:t>Pas de simu sur les polygones</a:t>
+            </a:r>
+          </a:p>
+          <a:p>
+            <a:pPr lvl="1"/>
+            <a:r>
+              <a:rPr lang="fr-FR" dirty="0"/>
+              <a:t>Pas de sauvegarde en BDD</a:t>
+            </a:r>
+          </a:p>
+          <a:p>
+            <a:pPr lvl="1"/>
+            <a:r>
+              <a:rPr lang="fr-FR" dirty="0"/>
+              <a:t>Pas d’interface de création d’objets</a:t>
+            </a:r>
+          </a:p>
+          <a:p>
+            <a:r>
+              <a:rPr lang="fr-FR" dirty="0"/>
+              <a:t>Causes :</a:t>
+            </a:r>
+          </a:p>
+          <a:p>
+            <a:pPr lvl="1"/>
+            <a:r>
+              <a:rPr lang="fr-FR" dirty="0"/>
+              <a:t>Projet dimensionné pour deux personnes</a:t>
+            </a:r>
+          </a:p>
+          <a:p>
+            <a:pPr lvl="1"/>
+            <a:r>
+              <a:rPr lang="fr-FR" dirty="0"/>
+              <a:t>Perte de temps sur la mise au point des calculs</a:t>
+            </a:r>
+          </a:p>
+          <a:p>
+            <a:pPr lvl="1"/>
+            <a:r>
+              <a:rPr lang="fr-FR" dirty="0"/>
+              <a:t>Non utilisation de librairies existantes sur le calcul de déformation</a:t>
+            </a:r>
           </a:p>
         </p:txBody>
       </p:sp>
@@ -8061,6 +8095,167 @@
     <p:extLst>
       <p:ext uri="{BB962C8B-B14F-4D97-AF65-F5344CB8AC3E}">
         <p14:creationId xmlns:p14="http://schemas.microsoft.com/office/powerpoint/2010/main" val="2008225902"/>
+      </p:ext>
+    </p:extLst>
+  </p:cSld>
+  <p:clrMapOvr>
+    <a:masterClrMapping/>
+  </p:clrMapOvr>
+</p:sld>
+</file>
+
+<file path=ppt/slides/slide21.xml><?xml version="1.0" encoding="utf-8"?>
+<p:sld xmlns:a="http://schemas.openxmlformats.org/drawingml/2006/main" xmlns:r="http://schemas.openxmlformats.org/officeDocument/2006/relationships" xmlns:p="http://schemas.openxmlformats.org/presentationml/2006/main">
+  <p:cSld>
+    <p:spTree>
+      <p:nvGrpSpPr>
+        <p:cNvPr id="1" name=""/>
+        <p:cNvGrpSpPr/>
+        <p:nvPr/>
+      </p:nvGrpSpPr>
+      <p:grpSpPr>
+        <a:xfrm>
+          <a:off x="0" y="0"/>
+          <a:ext cx="0" cy="0"/>
+          <a:chOff x="0" y="0"/>
+          <a:chExt cx="0" cy="0"/>
+        </a:xfrm>
+      </p:grpSpPr>
+      <p:sp>
+        <p:nvSpPr>
+          <p:cNvPr id="2" name="Title 1">
+            <a:extLst>
+              <a:ext uri="{FF2B5EF4-FFF2-40B4-BE49-F238E27FC236}">
+                <a16:creationId xmlns:a16="http://schemas.microsoft.com/office/drawing/2014/main" id="{BAD5DED2-9408-4EF8-B3CA-6436BD0A3FB5}"/>
+              </a:ext>
+            </a:extLst>
+          </p:cNvPr>
+          <p:cNvSpPr>
+            <a:spLocks noGrp="1"/>
+          </p:cNvSpPr>
+          <p:nvPr>
+            <p:ph type="title"/>
+          </p:nvPr>
+        </p:nvSpPr>
+        <p:spPr/>
+        <p:txBody>
+          <a:bodyPr/>
+          <a:lstStyle/>
+          <a:p>
+            <a:r>
+              <a:rPr lang="fr-FR" dirty="0"/>
+              <a:t>Perspective d’</a:t>
+            </a:r>
+            <a:r>
+              <a:rPr lang="fr-FR" dirty="0" err="1"/>
+              <a:t>amlélioration</a:t>
+            </a:r>
+            <a:endParaRPr lang="en-US" dirty="0"/>
+          </a:p>
+        </p:txBody>
+      </p:sp>
+      <p:sp>
+        <p:nvSpPr>
+          <p:cNvPr id="3" name="Content Placeholder 2">
+            <a:extLst>
+              <a:ext uri="{FF2B5EF4-FFF2-40B4-BE49-F238E27FC236}">
+                <a16:creationId xmlns:a16="http://schemas.microsoft.com/office/drawing/2014/main" id="{E3D22249-DB2A-4AF4-A9B2-53CFF9CAB94C}"/>
+              </a:ext>
+            </a:extLst>
+          </p:cNvPr>
+          <p:cNvSpPr>
+            <a:spLocks noGrp="1"/>
+          </p:cNvSpPr>
+          <p:nvPr>
+            <p:ph idx="1"/>
+          </p:nvPr>
+        </p:nvSpPr>
+        <p:spPr/>
+        <p:txBody>
+          <a:bodyPr/>
+          <a:lstStyle/>
+          <a:p>
+            <a:r>
+              <a:rPr lang="fr-FR" dirty="0"/>
+              <a:t>Finir le projet</a:t>
+            </a:r>
+          </a:p>
+          <a:p>
+            <a:r>
+              <a:rPr lang="fr-FR" dirty="0"/>
+              <a:t>Passer le tracer d’image sur OpenGL</a:t>
+            </a:r>
+          </a:p>
+          <a:p>
+            <a:r>
+              <a:rPr lang="fr-FR" dirty="0"/>
+              <a:t>Passer en 3D</a:t>
+            </a:r>
+            <a:endParaRPr lang="en-US" dirty="0"/>
+          </a:p>
+        </p:txBody>
+      </p:sp>
+      <p:sp>
+        <p:nvSpPr>
+          <p:cNvPr id="4" name="Footer Placeholder 3">
+            <a:extLst>
+              <a:ext uri="{FF2B5EF4-FFF2-40B4-BE49-F238E27FC236}">
+                <a16:creationId xmlns:a16="http://schemas.microsoft.com/office/drawing/2014/main" id="{85BF23AD-D83B-43BD-A24A-15848C90F9AB}"/>
+              </a:ext>
+            </a:extLst>
+          </p:cNvPr>
+          <p:cNvSpPr>
+            <a:spLocks noGrp="1"/>
+          </p:cNvSpPr>
+          <p:nvPr>
+            <p:ph type="ftr" sz="quarter" idx="11"/>
+          </p:nvPr>
+        </p:nvSpPr>
+        <p:spPr/>
+        <p:txBody>
+          <a:bodyPr/>
+          <a:lstStyle/>
+          <a:p>
+            <a:r>
+              <a:rPr lang="en-US"/>
+              <a:t>Projet Simu3Delta</a:t>
+            </a:r>
+          </a:p>
+        </p:txBody>
+      </p:sp>
+      <p:sp>
+        <p:nvSpPr>
+          <p:cNvPr id="5" name="Slide Number Placeholder 4">
+            <a:extLst>
+              <a:ext uri="{FF2B5EF4-FFF2-40B4-BE49-F238E27FC236}">
+                <a16:creationId xmlns:a16="http://schemas.microsoft.com/office/drawing/2014/main" id="{6D6B45ED-5AF0-49B9-B3DC-B99933909C0B}"/>
+              </a:ext>
+            </a:extLst>
+          </p:cNvPr>
+          <p:cNvSpPr>
+            <a:spLocks noGrp="1"/>
+          </p:cNvSpPr>
+          <p:nvPr>
+            <p:ph type="sldNum" sz="quarter" idx="12"/>
+          </p:nvPr>
+        </p:nvSpPr>
+        <p:spPr/>
+        <p:txBody>
+          <a:bodyPr/>
+          <a:lstStyle/>
+          <a:p>
+            <a:fld id="{D9775511-155A-44AA-B6D7-C6AAD3DD665A}" type="slidenum">
+              <a:rPr lang="en-US" smtClean="0"/>
+              <a:t>21</a:t>
+            </a:fld>
+            <a:endParaRPr lang="en-US"/>
+          </a:p>
+        </p:txBody>
+      </p:sp>
+    </p:spTree>
+    <p:extLst>
+      <p:ext uri="{BB962C8B-B14F-4D97-AF65-F5344CB8AC3E}">
+        <p14:creationId xmlns:p14="http://schemas.microsoft.com/office/powerpoint/2010/main" val="3456671681"/>
       </p:ext>
     </p:extLst>
   </p:cSld>
@@ -8324,13 +8519,8 @@
             <a:pPr lvl="1"/>
             <a:r>
               <a:rPr lang="fr-FR" dirty="0"/>
-              <a:t>Définir ce à quoi va ressembler l’</a:t>
-            </a:r>
-            <a:r>
-              <a:rPr lang="fr-FR" dirty="0" err="1"/>
-              <a:t>aplication</a:t>
-            </a:r>
-            <a:endParaRPr lang="fr-FR" dirty="0"/>
+              <a:t>Définir l’ergonomie de l’application</a:t>
+            </a:r>
           </a:p>
           <a:p>
             <a:pPr lvl="1"/>

</xml_diff>